<commit_message>
modified a tonne of stuff, got the k-means working perfectly with graphs and saved it to mtf file.
</commit_message>
<xml_diff>
--- a/poster.pptx
+++ b/poster.pptx
@@ -1941,7 +1941,31 @@
                 </a:solidFill>
                 <a:cs typeface="Arial" pitchFamily="34" charset="0"/>
               </a:rPr>
-              <a:t>We picked k to be the value of k that maximized the average silhouette value over 10 trials. We then stored the best clustering in a .</a:t>
+              <a:t>We picked k to be the value of k that maximized the average silhouette value </a:t>
+            </a:r>
+            <a:r>
+              <a:rPr lang="en-US" sz="1800" smtClean="0">
+                <a:solidFill>
+                  <a:schemeClr val="tx1">
+                    <a:lumMod val="65000"/>
+                    <a:lumOff val="35000"/>
+                  </a:schemeClr>
+                </a:solidFill>
+                <a:cs typeface="Arial" pitchFamily="34" charset="0"/>
+              </a:rPr>
+              <a:t>over five trials</a:t>
+            </a:r>
+            <a:r>
+              <a:rPr lang="en-US" sz="1800" dirty="0" smtClean="0">
+                <a:solidFill>
+                  <a:schemeClr val="tx1">
+                    <a:lumMod val="65000"/>
+                    <a:lumOff val="35000"/>
+                  </a:schemeClr>
+                </a:solidFill>
+                <a:cs typeface="Arial" pitchFamily="34" charset="0"/>
+              </a:rPr>
+              <a:t>. We then stored the best clustering in a .</a:t>
             </a:r>
             <a:r>
               <a:rPr lang="en-US" sz="1800" dirty="0" err="1" smtClean="0">
@@ -2106,7 +2130,7 @@
         <p:spPr>
           <a:xfrm>
             <a:off x="14084016" y="4726340"/>
-            <a:ext cx="6223000" cy="13624230"/>
+            <a:ext cx="6223000" cy="13901229"/>
           </a:xfrm>
           <a:prstGeom prst="rect">
             <a:avLst/>
@@ -2129,7 +2153,7 @@
                 </a:solidFill>
                 <a:cs typeface="Arial" pitchFamily="34" charset="0"/>
               </a:rPr>
-              <a:t>For our tests we used midi files from popular contemporary Western music. This is because this genre is known for its simplicity in chord progression and because the midi files are readily and easily available to download. We had a corpus of 60 midi songs that we were evaluating on. For the first part of project, we combined the bar vectors from the 60 midi songs and ran k-means on them. An example of the results from running the k-means algorithm on a single song is as follows. </a:t>
+              <a:t>For our tests we used midi files from popular contemporary Western music. This is because this genre is known for its simplicity in chord progression and because the midi files are readily and easily available to download. We had a corpus of 60 midi songs that we were evaluating on. For the first part of project, we combined the bar vectors from the 60 midi songs and ran k-means on them. An example of the results from running the k-means algorithm on a single song (Fifteen, Taylor Swift) is as follows. </a:t>
             </a:r>
           </a:p>
           <a:p>
@@ -2315,6 +2339,17 @@
             </a:endParaRPr>
           </a:p>
           <a:p>
+            <a:endParaRPr lang="en-US" sz="1800" dirty="0" smtClean="0">
+              <a:solidFill>
+                <a:schemeClr val="tx1">
+                  <a:lumMod val="65000"/>
+                  <a:lumOff val="35000"/>
+                </a:schemeClr>
+              </a:solidFill>
+              <a:cs typeface="Arial" pitchFamily="34" charset="0"/>
+            </a:endParaRPr>
+          </a:p>
+          <a:p>
             <a:r>
               <a:rPr lang="en-US" sz="1800" dirty="0" smtClean="0">
                 <a:solidFill>
@@ -2352,6 +2387,17 @@
           </a:p>
           <a:p>
             <a:endParaRPr lang="en-US" sz="1800" dirty="0">
+              <a:solidFill>
+                <a:schemeClr val="tx1">
+                  <a:lumMod val="65000"/>
+                  <a:lumOff val="35000"/>
+                </a:schemeClr>
+              </a:solidFill>
+              <a:cs typeface="Arial" pitchFamily="34" charset="0"/>
+            </a:endParaRPr>
+          </a:p>
+          <a:p>
+            <a:endParaRPr lang="en-US" sz="1800" dirty="0" smtClean="0">
               <a:solidFill>
                 <a:schemeClr val="tx1">
                   <a:lumMod val="65000"/>
@@ -3018,6 +3064,93 @@
           </a:p>
         </p:txBody>
       </p:sp>
+      <p:pic>
+        <p:nvPicPr>
+          <p:cNvPr id="2" name="Picture 1" descr="fifteen_keyboard.png"/>
+          <p:cNvPicPr>
+            <a:picLocks noChangeAspect="1"/>
+          </p:cNvPicPr>
+          <p:nvPr/>
+        </p:nvPicPr>
+        <p:blipFill rotWithShape="1">
+          <a:blip r:embed="rId3">
+            <a:extLst>
+              <a:ext uri="{28A0092B-C50C-407E-A947-70E740481C1C}">
+                <a14:useLocalDpi xmlns:a14="http://schemas.microsoft.com/office/drawing/2010/main" val="0"/>
+              </a:ext>
+            </a:extLst>
+          </a:blip>
+          <a:srcRect l="45098" t="9423" r="42647" b="9423"/>
+          <a:stretch/>
+        </p:blipFill>
+        <p:spPr>
+          <a:xfrm rot="16200000">
+            <a:off x="16166353" y="6962588"/>
+            <a:ext cx="896470" cy="4452470"/>
+          </a:xfrm>
+          <a:prstGeom prst="rect">
+            <a:avLst/>
+          </a:prstGeom>
+        </p:spPr>
+      </p:pic>
+      <p:pic>
+        <p:nvPicPr>
+          <p:cNvPr id="3" name="Picture 2" descr="fifteen_heatmap.png"/>
+          <p:cNvPicPr>
+            <a:picLocks noChangeAspect="1"/>
+          </p:cNvPicPr>
+          <p:nvPr/>
+        </p:nvPicPr>
+        <p:blipFill rotWithShape="1">
+          <a:blip r:embed="rId4">
+            <a:extLst>
+              <a:ext uri="{28A0092B-C50C-407E-A947-70E740481C1C}">
+                <a14:useLocalDpi xmlns:a14="http://schemas.microsoft.com/office/drawing/2010/main" val="0"/>
+              </a:ext>
+            </a:extLst>
+          </a:blip>
+          <a:srcRect l="11874" t="8606" r="7244" b="7516"/>
+          <a:stretch/>
+        </p:blipFill>
+        <p:spPr>
+          <a:xfrm>
+            <a:off x="14597529" y="11344227"/>
+            <a:ext cx="1912471" cy="1983303"/>
+          </a:xfrm>
+          <a:prstGeom prst="rect">
+            <a:avLst/>
+          </a:prstGeom>
+        </p:spPr>
+      </p:pic>
+      <p:pic>
+        <p:nvPicPr>
+          <p:cNvPr id="4" name="Picture 3" descr="fifteen_midi.png"/>
+          <p:cNvPicPr>
+            <a:picLocks noChangeAspect="1"/>
+          </p:cNvPicPr>
+          <p:nvPr/>
+        </p:nvPicPr>
+        <p:blipFill rotWithShape="1">
+          <a:blip r:embed="rId5">
+            <a:extLst>
+              <a:ext uri="{28A0092B-C50C-407E-A947-70E740481C1C}">
+                <a14:useLocalDpi xmlns:a14="http://schemas.microsoft.com/office/drawing/2010/main" val="0"/>
+              </a:ext>
+            </a:extLst>
+          </a:blip>
+          <a:srcRect l="3840" t="4248" r="7312"/>
+          <a:stretch/>
+        </p:blipFill>
+        <p:spPr>
+          <a:xfrm>
+            <a:off x="14448117" y="13859249"/>
+            <a:ext cx="3272118" cy="2644774"/>
+          </a:xfrm>
+          <a:prstGeom prst="rect">
+            <a:avLst/>
+          </a:prstGeom>
+        </p:spPr>
+      </p:pic>
     </p:spTree>
     <p:extLst>
       <p:ext uri="{BB962C8B-B14F-4D97-AF65-F5344CB8AC3E}">

</xml_diff>